<commit_message>
Completed draft of slides + my notes from lesson
</commit_message>
<xml_diff>
--- a/Final presentation/MIDI Standard - Gabriel Rovesti 2103389.pptx
+++ b/Final presentation/MIDI Standard - Gabriel Rovesti 2103389.pptx
@@ -17,8 +17,8 @@
     <p:sldId id="269" r:id="rId8"/>
     <p:sldId id="271" r:id="rId9"/>
     <p:sldId id="272" r:id="rId10"/>
-    <p:sldId id="267" r:id="rId11"/>
-    <p:sldId id="268" r:id="rId12"/>
+    <p:sldId id="268" r:id="rId11"/>
+    <p:sldId id="273" r:id="rId12"/>
     <p:sldId id="261" r:id="rId13"/>
   </p:sldIdLst>
   <p:sldSz cx="9144000" cy="6858000" type="screen4x3"/>
@@ -1922,7 +1922,186 @@
                 <a:latin typeface="Segoe UI" panose="020B0502040204020203" pitchFamily="34" charset="0"/>
                 <a:cs typeface="Segoe UI" panose="020B0502040204020203" pitchFamily="34" charset="0"/>
               </a:rPr>
-              <a:t>Modes</a:t>
+              <a:t>Devices and connections</a:t>
+            </a:r>
+          </a:p>
+        </p:txBody>
+      </p:sp>
+      <p:sp>
+        <p:nvSpPr>
+          <p:cNvPr id="6" name="CasellaDiTesto 5">
+            <a:extLst>
+              <a:ext uri="{FF2B5EF4-FFF2-40B4-BE49-F238E27FC236}">
+                <a16:creationId xmlns:a16="http://schemas.microsoft.com/office/drawing/2014/main" id="{0C3825A1-BC2D-A575-E5DA-F3AAE95E3E9E}"/>
+              </a:ext>
+            </a:extLst>
+          </p:cNvPr>
+          <p:cNvSpPr txBox="1"/>
+          <p:nvPr/>
+        </p:nvSpPr>
+        <p:spPr>
+          <a:xfrm>
+            <a:off x="247135" y="1433945"/>
+            <a:ext cx="8543574" cy="2677656"/>
+          </a:xfrm>
+          <a:prstGeom prst="rect">
+            <a:avLst/>
+          </a:prstGeom>
+          <a:noFill/>
+        </p:spPr>
+        <p:txBody>
+          <a:bodyPr wrap="square" rtlCol="0">
+            <a:spAutoFit/>
+          </a:bodyPr>
+          <a:lstStyle/>
+          <a:p>
+            <a:pPr marL="285750" indent="-285750">
+              <a:buFontTx/>
+              <a:buChar char="-"/>
+            </a:pPr>
+            <a:r>
+              <a:rPr lang="it-IT" sz="2400" dirty="0">
+                <a:latin typeface="Segoe UI" panose="020B0502040204020203" pitchFamily="34" charset="0"/>
+                <a:cs typeface="Segoe UI" panose="020B0502040204020203" pitchFamily="34" charset="0"/>
+              </a:rPr>
+              <a:t>MIDI also establishes which physical connections should be made (</a:t>
+            </a:r>
+            <a:r>
+              <a:rPr lang="it-IT" sz="2400" i="1" dirty="0">
+                <a:latin typeface="Segoe UI" panose="020B0502040204020203" pitchFamily="34" charset="0"/>
+                <a:cs typeface="Segoe UI" panose="020B0502040204020203" pitchFamily="34" charset="0"/>
+              </a:rPr>
+              <a:t>interfaces</a:t>
+            </a:r>
+            <a:r>
+              <a:rPr lang="it-IT" sz="2400" dirty="0">
+                <a:latin typeface="Segoe UI" panose="020B0502040204020203" pitchFamily="34" charset="0"/>
+                <a:cs typeface="Segoe UI" panose="020B0502040204020203" pitchFamily="34" charset="0"/>
+              </a:rPr>
+              <a:t>), via DIN connectors</a:t>
+            </a:r>
+          </a:p>
+          <a:p>
+            <a:pPr marL="285750" indent="-285750">
+              <a:buFontTx/>
+              <a:buChar char="-"/>
+            </a:pPr>
+            <a:endParaRPr lang="it-IT" sz="2400" dirty="0">
+              <a:latin typeface="Segoe UI" panose="020B0502040204020203" pitchFamily="34" charset="0"/>
+              <a:cs typeface="Segoe UI" panose="020B0502040204020203" pitchFamily="34" charset="0"/>
+            </a:endParaRPr>
+          </a:p>
+          <a:p>
+            <a:pPr marL="285750" indent="-285750">
+              <a:buFontTx/>
+              <a:buChar char="-"/>
+            </a:pPr>
+            <a:r>
+              <a:rPr lang="it-IT" sz="2400" dirty="0">
+                <a:latin typeface="Segoe UI" panose="020B0502040204020203" pitchFamily="34" charset="0"/>
+                <a:cs typeface="Segoe UI" panose="020B0502040204020203" pitchFamily="34" charset="0"/>
+              </a:rPr>
+              <a:t>There are three </a:t>
+            </a:r>
+            <a:r>
+              <a:rPr lang="it-IT" sz="2400" i="1" dirty="0">
+                <a:latin typeface="Segoe UI" panose="020B0502040204020203" pitchFamily="34" charset="0"/>
+                <a:cs typeface="Segoe UI" panose="020B0502040204020203" pitchFamily="34" charset="0"/>
+              </a:rPr>
+              <a:t>types</a:t>
+            </a:r>
+            <a:r>
+              <a:rPr lang="it-IT" sz="2400" dirty="0">
+                <a:latin typeface="Segoe UI" panose="020B0502040204020203" pitchFamily="34" charset="0"/>
+                <a:cs typeface="Segoe UI" panose="020B0502040204020203" pitchFamily="34" charset="0"/>
+              </a:rPr>
+              <a:t> of </a:t>
+            </a:r>
+            <a:r>
+              <a:rPr lang="it-IT" sz="2400" u="sng" dirty="0">
+                <a:latin typeface="Segoe UI" panose="020B0502040204020203" pitchFamily="34" charset="0"/>
+                <a:cs typeface="Segoe UI" panose="020B0502040204020203" pitchFamily="34" charset="0"/>
+              </a:rPr>
+              <a:t>ports</a:t>
+            </a:r>
+            <a:r>
+              <a:rPr lang="it-IT" sz="2400" dirty="0">
+                <a:latin typeface="Segoe UI" panose="020B0502040204020203" pitchFamily="34" charset="0"/>
+                <a:cs typeface="Segoe UI" panose="020B0502040204020203" pitchFamily="34" charset="0"/>
+              </a:rPr>
+              <a:t>: In/Out/Thru</a:t>
+            </a:r>
+          </a:p>
+          <a:p>
+            <a:pPr marL="285750" indent="-285750">
+              <a:buFontTx/>
+              <a:buChar char="-"/>
+            </a:pPr>
+            <a:endParaRPr lang="it-IT" sz="2400" dirty="0">
+              <a:latin typeface="Segoe UI" panose="020B0502040204020203" pitchFamily="34" charset="0"/>
+              <a:cs typeface="Segoe UI" panose="020B0502040204020203" pitchFamily="34" charset="0"/>
+            </a:endParaRPr>
+          </a:p>
+          <a:p>
+            <a:pPr marL="285750" indent="-285750">
+              <a:buFontTx/>
+              <a:buChar char="-"/>
+            </a:pPr>
+            <a:r>
+              <a:rPr lang="it-IT" sz="2400" dirty="0">
+                <a:latin typeface="Segoe UI" panose="020B0502040204020203" pitchFamily="34" charset="0"/>
+                <a:cs typeface="Segoe UI" panose="020B0502040204020203" pitchFamily="34" charset="0"/>
+              </a:rPr>
+              <a:t>They can easily form a </a:t>
+            </a:r>
+            <a:r>
+              <a:rPr lang="it-IT" sz="2400" u="sng" dirty="0">
+                <a:latin typeface="Segoe UI" panose="020B0502040204020203" pitchFamily="34" charset="0"/>
+                <a:cs typeface="Segoe UI" panose="020B0502040204020203" pitchFamily="34" charset="0"/>
+              </a:rPr>
+              <a:t>network</a:t>
+            </a:r>
+            <a:r>
+              <a:rPr lang="it-IT" sz="2400" i="1" dirty="0">
+                <a:latin typeface="Segoe UI" panose="020B0502040204020203" pitchFamily="34" charset="0"/>
+                <a:cs typeface="Segoe UI" panose="020B0502040204020203" pitchFamily="34" charset="0"/>
+              </a:rPr>
+              <a:t> </a:t>
+            </a:r>
+            <a:r>
+              <a:rPr lang="it-IT" sz="2400" dirty="0">
+                <a:latin typeface="Segoe UI" panose="020B0502040204020203" pitchFamily="34" charset="0"/>
+                <a:cs typeface="Segoe UI" panose="020B0502040204020203" pitchFamily="34" charset="0"/>
+              </a:rPr>
+              <a:t>providing </a:t>
+            </a:r>
+            <a:r>
+              <a:rPr lang="it-IT" sz="2400" i="1" dirty="0">
+                <a:latin typeface="Segoe UI" panose="020B0502040204020203" pitchFamily="34" charset="0"/>
+                <a:cs typeface="Segoe UI" panose="020B0502040204020203" pitchFamily="34" charset="0"/>
+              </a:rPr>
+              <a:t>interconnectivity</a:t>
+            </a:r>
+            <a:r>
+              <a:rPr lang="it-IT" sz="2400" dirty="0">
+                <a:latin typeface="Segoe UI" panose="020B0502040204020203" pitchFamily="34" charset="0"/>
+                <a:cs typeface="Segoe UI" panose="020B0502040204020203" pitchFamily="34" charset="0"/>
+              </a:rPr>
+              <a:t> between different </a:t>
+            </a:r>
+            <a:r>
+              <a:rPr lang="it-IT" sz="2400" i="1" dirty="0">
+                <a:latin typeface="Segoe UI" panose="020B0502040204020203" pitchFamily="34" charset="0"/>
+                <a:cs typeface="Segoe UI" panose="020B0502040204020203" pitchFamily="34" charset="0"/>
+              </a:rPr>
+              <a:t>devices</a:t>
+            </a:r>
+            <a:r>
+              <a:rPr lang="it-IT" sz="2400" dirty="0">
+                <a:latin typeface="Segoe UI" panose="020B0502040204020203" pitchFamily="34" charset="0"/>
+                <a:cs typeface="Segoe UI" panose="020B0502040204020203" pitchFamily="34" charset="0"/>
+              </a:rPr>
+              <a:t> (e.g., daisy chaining, Thru Boxes)</a:t>
             </a:r>
           </a:p>
         </p:txBody>
@@ -1958,7 +2137,7 @@
                 <a:latin typeface="Segoe UI" panose="020B0502040204020203" pitchFamily="34" charset="0"/>
                 <a:cs typeface="Segoe UI" panose="020B0502040204020203" pitchFamily="34" charset="0"/>
               </a:rPr>
-              <a:t>MIDI Standard– 3/N</a:t>
+              <a:t>MIDI Standard– 10/12</a:t>
             </a:r>
           </a:p>
         </p:txBody>
@@ -1968,7 +2147,7 @@
           <p:cNvPr id="5" name="Immagine 4">
             <a:extLst>
               <a:ext uri="{FF2B5EF4-FFF2-40B4-BE49-F238E27FC236}">
-                <a16:creationId xmlns:a16="http://schemas.microsoft.com/office/drawing/2014/main" id="{88C4D121-F1DC-F07F-7E4E-7C86E990BAF8}"/>
+                <a16:creationId xmlns:a16="http://schemas.microsoft.com/office/drawing/2014/main" id="{2A862B55-50FA-1BBE-D8CD-153073BA24F0}"/>
               </a:ext>
             </a:extLst>
           </p:cNvPr>
@@ -1985,18 +2164,53 @@
         </p:blipFill>
         <p:spPr>
           <a:xfrm>
-            <a:off x="1945793" y="1370659"/>
-            <a:ext cx="4951668" cy="4765203"/>
+            <a:off x="2642235" y="4290666"/>
+            <a:ext cx="3753374" cy="1267002"/>
           </a:xfrm>
           <a:prstGeom prst="rect">
             <a:avLst/>
           </a:prstGeom>
         </p:spPr>
       </p:pic>
+      <p:sp>
+        <p:nvSpPr>
+          <p:cNvPr id="7" name="CasellaDiTesto 6">
+            <a:extLst>
+              <a:ext uri="{FF2B5EF4-FFF2-40B4-BE49-F238E27FC236}">
+                <a16:creationId xmlns:a16="http://schemas.microsoft.com/office/drawing/2014/main" id="{98116039-3419-5CE2-7566-67F14C9FCED2}"/>
+              </a:ext>
+            </a:extLst>
+          </p:cNvPr>
+          <p:cNvSpPr txBox="1"/>
+          <p:nvPr/>
+        </p:nvSpPr>
+        <p:spPr>
+          <a:xfrm>
+            <a:off x="3530753" y="5736733"/>
+            <a:ext cx="2328851" cy="276999"/>
+          </a:xfrm>
+          <a:prstGeom prst="rect">
+            <a:avLst/>
+          </a:prstGeom>
+          <a:noFill/>
+        </p:spPr>
+        <p:txBody>
+          <a:bodyPr wrap="square" rtlCol="0">
+            <a:spAutoFit/>
+          </a:bodyPr>
+          <a:lstStyle/>
+          <a:p>
+            <a:r>
+              <a:rPr lang="it-IT" sz="1200" dirty="0"/>
+              <a:t>Source: MIDI 1.0 Specifications</a:t>
+            </a:r>
+          </a:p>
+        </p:txBody>
+      </p:sp>
     </p:spTree>
     <p:extLst>
       <p:ext uri="{BB962C8B-B14F-4D97-AF65-F5344CB8AC3E}">
-        <p14:creationId xmlns:p14="http://schemas.microsoft.com/office/powerpoint/2010/main" val="2553713065"/>
+        <p14:creationId xmlns:p14="http://schemas.microsoft.com/office/powerpoint/2010/main" val="3344082545"/>
       </p:ext>
     </p:extLst>
   </p:cSld>
@@ -2056,70 +2270,8 @@
                 <a:latin typeface="Segoe UI" panose="020B0502040204020203" pitchFamily="34" charset="0"/>
                 <a:cs typeface="Segoe UI" panose="020B0502040204020203" pitchFamily="34" charset="0"/>
               </a:rPr>
-              <a:t>Devices and connections</a:t>
-            </a:r>
-          </a:p>
-        </p:txBody>
-      </p:sp>
-      <p:sp>
-        <p:nvSpPr>
-          <p:cNvPr id="6" name="CasellaDiTesto 5">
-            <a:extLst>
-              <a:ext uri="{FF2B5EF4-FFF2-40B4-BE49-F238E27FC236}">
-                <a16:creationId xmlns:a16="http://schemas.microsoft.com/office/drawing/2014/main" id="{0C3825A1-BC2D-A575-E5DA-F3AAE95E3E9E}"/>
-              </a:ext>
-            </a:extLst>
-          </p:cNvPr>
-          <p:cNvSpPr txBox="1"/>
-          <p:nvPr/>
-        </p:nvSpPr>
-        <p:spPr>
-          <a:xfrm>
-            <a:off x="446809" y="1433945"/>
-            <a:ext cx="8343900" cy="1200329"/>
-          </a:xfrm>
-          <a:prstGeom prst="rect">
-            <a:avLst/>
-          </a:prstGeom>
-          <a:noFill/>
-        </p:spPr>
-        <p:txBody>
-          <a:bodyPr wrap="square" rtlCol="0">
-            <a:spAutoFit/>
-          </a:bodyPr>
-          <a:lstStyle/>
-          <a:p>
-            <a:pPr marL="285750" indent="-285750">
-              <a:buFontTx/>
-              <a:buChar char="-"/>
-            </a:pPr>
-            <a:r>
-              <a:rPr lang="it-IT" sz="2400" dirty="0">
-                <a:latin typeface="Segoe UI" panose="020B0502040204020203" pitchFamily="34" charset="0"/>
-                <a:cs typeface="Segoe UI" panose="020B0502040204020203" pitchFamily="34" charset="0"/>
-              </a:rPr>
-              <a:t>aaa</a:t>
-            </a:r>
-          </a:p>
-          <a:p>
-            <a:pPr marL="285750" indent="-285750">
-              <a:buFontTx/>
-              <a:buChar char="-"/>
-            </a:pPr>
-            <a:endParaRPr lang="it-IT" sz="2400" dirty="0">
-              <a:latin typeface="Segoe UI" panose="020B0502040204020203" pitchFamily="34" charset="0"/>
-              <a:cs typeface="Segoe UI" panose="020B0502040204020203" pitchFamily="34" charset="0"/>
-            </a:endParaRPr>
-          </a:p>
-          <a:p>
-            <a:pPr marL="285750" indent="-285750">
-              <a:buFontTx/>
-              <a:buChar char="-"/>
-            </a:pPr>
-            <a:endParaRPr lang="it-IT" sz="2400" dirty="0">
-              <a:latin typeface="Segoe UI" panose="020B0502040204020203" pitchFamily="34" charset="0"/>
-              <a:cs typeface="Segoe UI" panose="020B0502040204020203" pitchFamily="34" charset="0"/>
-            </a:endParaRPr>
+              <a:t>A MIDI System Example</a:t>
+            </a:r>
           </a:p>
         </p:txBody>
       </p:sp>
@@ -2154,15 +2306,80 @@
                 <a:latin typeface="Segoe UI" panose="020B0502040204020203" pitchFamily="34" charset="0"/>
                 <a:cs typeface="Segoe UI" panose="020B0502040204020203" pitchFamily="34" charset="0"/>
               </a:rPr>
-              <a:t>MIDI Standard– 3/N</a:t>
-            </a:r>
-          </a:p>
-        </p:txBody>
-      </p:sp>
+              <a:t>MIDI Standard– 11/12</a:t>
+            </a:r>
+          </a:p>
+        </p:txBody>
+      </p:sp>
+      <p:sp>
+        <p:nvSpPr>
+          <p:cNvPr id="7" name="CasellaDiTesto 6">
+            <a:extLst>
+              <a:ext uri="{FF2B5EF4-FFF2-40B4-BE49-F238E27FC236}">
+                <a16:creationId xmlns:a16="http://schemas.microsoft.com/office/drawing/2014/main" id="{98116039-3419-5CE2-7566-67F14C9FCED2}"/>
+              </a:ext>
+            </a:extLst>
+          </p:cNvPr>
+          <p:cNvSpPr txBox="1"/>
+          <p:nvPr/>
+        </p:nvSpPr>
+        <p:spPr>
+          <a:xfrm>
+            <a:off x="3530753" y="5736733"/>
+            <a:ext cx="2328851" cy="276999"/>
+          </a:xfrm>
+          <a:prstGeom prst="rect">
+            <a:avLst/>
+          </a:prstGeom>
+          <a:noFill/>
+        </p:spPr>
+        <p:txBody>
+          <a:bodyPr wrap="square" rtlCol="0">
+            <a:spAutoFit/>
+          </a:bodyPr>
+          <a:lstStyle/>
+          <a:p>
+            <a:r>
+              <a:rPr lang="it-IT" sz="1200" dirty="0"/>
+              <a:t>Source: academictutorials.com</a:t>
+            </a:r>
+          </a:p>
+        </p:txBody>
+      </p:sp>
+      <p:pic>
+        <p:nvPicPr>
+          <p:cNvPr id="10" name="Immagine 9">
+            <a:extLst>
+              <a:ext uri="{FF2B5EF4-FFF2-40B4-BE49-F238E27FC236}">
+                <a16:creationId xmlns:a16="http://schemas.microsoft.com/office/drawing/2014/main" id="{0B41B9FB-0883-8315-9061-ACD6F9626AB7}"/>
+              </a:ext>
+            </a:extLst>
+          </p:cNvPr>
+          <p:cNvPicPr>
+            <a:picLocks noChangeAspect="1"/>
+          </p:cNvPicPr>
+          <p:nvPr/>
+        </p:nvPicPr>
+        <p:blipFill>
+          <a:blip r:embed="rId2"/>
+          <a:stretch>
+            <a:fillRect/>
+          </a:stretch>
+        </p:blipFill>
+        <p:spPr>
+          <a:xfrm>
+            <a:off x="580378" y="1675548"/>
+            <a:ext cx="8229600" cy="3861856"/>
+          </a:xfrm>
+          <a:prstGeom prst="rect">
+            <a:avLst/>
+          </a:prstGeom>
+        </p:spPr>
+      </p:pic>
     </p:spTree>
     <p:extLst>
       <p:ext uri="{BB962C8B-B14F-4D97-AF65-F5344CB8AC3E}">
-        <p14:creationId xmlns:p14="http://schemas.microsoft.com/office/powerpoint/2010/main" val="3344082545"/>
+        <p14:creationId xmlns:p14="http://schemas.microsoft.com/office/powerpoint/2010/main" val="888494136"/>
       </p:ext>
     </p:extLst>
   </p:cSld>
@@ -2241,8 +2458,8 @@
         </p:nvSpPr>
         <p:spPr>
           <a:xfrm>
-            <a:off x="446809" y="1433945"/>
-            <a:ext cx="8343900" cy="1200329"/>
+            <a:off x="400050" y="1188750"/>
+            <a:ext cx="8343900" cy="4093428"/>
           </a:xfrm>
           <a:prstGeom prst="rect">
             <a:avLst/>
@@ -2255,24 +2472,16 @@
           </a:bodyPr>
           <a:lstStyle/>
           <a:p>
-            <a:pPr marL="285750" indent="-285750">
-              <a:buFontTx/>
-              <a:buChar char="-"/>
-            </a:pPr>
-            <a:r>
-              <a:rPr lang="it-IT" sz="2400" dirty="0">
-                <a:latin typeface="Segoe UI" panose="020B0502040204020203" pitchFamily="34" charset="0"/>
-                <a:cs typeface="Segoe UI" panose="020B0502040204020203" pitchFamily="34" charset="0"/>
-              </a:rPr>
-              <a:t>aaa</a:t>
-            </a:r>
-          </a:p>
-          <a:p>
-            <a:pPr marL="285750" indent="-285750">
-              <a:buFontTx/>
-              <a:buChar char="-"/>
-            </a:pPr>
-            <a:endParaRPr lang="it-IT" sz="2400" dirty="0">
+            <a:r>
+              <a:rPr lang="it-IT" sz="2000" u="sng" dirty="0">
+                <a:latin typeface="Segoe UI" panose="020B0502040204020203" pitchFamily="34" charset="0"/>
+                <a:cs typeface="Segoe UI" panose="020B0502040204020203" pitchFamily="34" charset="0"/>
+              </a:rPr>
+              <a:t>Pros</a:t>
+            </a:r>
+          </a:p>
+          <a:p>
+            <a:endParaRPr lang="it-IT" sz="2000" u="sng" dirty="0">
               <a:latin typeface="Segoe UI" panose="020B0502040204020203" pitchFamily="34" charset="0"/>
               <a:cs typeface="Segoe UI" panose="020B0502040204020203" pitchFamily="34" charset="0"/>
             </a:endParaRPr>
@@ -2282,10 +2491,133 @@
               <a:buFontTx/>
               <a:buChar char="-"/>
             </a:pPr>
-            <a:endParaRPr lang="it-IT" sz="2400" dirty="0">
+            <a:r>
+              <a:rPr lang="it-IT" sz="2000" dirty="0">
+                <a:latin typeface="Segoe UI" panose="020B0502040204020203" pitchFamily="34" charset="0"/>
+                <a:cs typeface="Segoe UI" panose="020B0502040204020203" pitchFamily="34" charset="0"/>
+              </a:rPr>
+              <a:t>Very flexible and editable in instruments configuration </a:t>
+            </a:r>
+          </a:p>
+          <a:p>
+            <a:pPr marL="285750" indent="-285750">
+              <a:buFontTx/>
+              <a:buChar char="-"/>
+            </a:pPr>
+            <a:r>
+              <a:rPr lang="it-IT" sz="2000" dirty="0">
+                <a:latin typeface="Segoe UI" panose="020B0502040204020203" pitchFamily="34" charset="0"/>
+                <a:cs typeface="Segoe UI" panose="020B0502040204020203" pitchFamily="34" charset="0"/>
+              </a:rPr>
+              <a:t>Files are very small and generally sound good</a:t>
+            </a:r>
+          </a:p>
+          <a:p>
+            <a:pPr marL="285750" indent="-285750">
+              <a:buFontTx/>
+              <a:buChar char="-"/>
+            </a:pPr>
+            <a:r>
+              <a:rPr lang="it-IT" sz="2000" dirty="0">
+                <a:latin typeface="Segoe UI" panose="020B0502040204020203" pitchFamily="34" charset="0"/>
+                <a:cs typeface="Segoe UI" panose="020B0502040204020203" pitchFamily="34" charset="0"/>
+              </a:rPr>
+              <a:t>It allows for easy editing for both professionals/amateurs</a:t>
+            </a:r>
+          </a:p>
+          <a:p>
+            <a:pPr marL="285750" indent="-285750">
+              <a:buFontTx/>
+              <a:buChar char="-"/>
+            </a:pPr>
+            <a:r>
+              <a:rPr lang="it-IT" sz="2000" dirty="0">
+                <a:latin typeface="Segoe UI" panose="020B0502040204020203" pitchFamily="34" charset="0"/>
+                <a:cs typeface="Segoe UI" panose="020B0502040204020203" pitchFamily="34" charset="0"/>
+              </a:rPr>
+              <a:t>Can be used both for modern and vintage technology </a:t>
+            </a:r>
+          </a:p>
+          <a:p>
+            <a:pPr marL="285750" indent="-285750">
+              <a:buFontTx/>
+              <a:buChar char="-"/>
+            </a:pPr>
+            <a:endParaRPr lang="it-IT" sz="2000" dirty="0">
               <a:latin typeface="Segoe UI" panose="020B0502040204020203" pitchFamily="34" charset="0"/>
               <a:cs typeface="Segoe UI" panose="020B0502040204020203" pitchFamily="34" charset="0"/>
             </a:endParaRPr>
+          </a:p>
+          <a:p>
+            <a:r>
+              <a:rPr lang="it-IT" sz="2000" u="sng" dirty="0">
+                <a:latin typeface="Segoe UI" panose="020B0502040204020203" pitchFamily="34" charset="0"/>
+                <a:cs typeface="Segoe UI" panose="020B0502040204020203" pitchFamily="34" charset="0"/>
+              </a:rPr>
+              <a:t>Cons</a:t>
+            </a:r>
+            <a:endParaRPr lang="it-IT" sz="2000" dirty="0">
+              <a:latin typeface="Segoe UI" panose="020B0502040204020203" pitchFamily="34" charset="0"/>
+              <a:cs typeface="Segoe UI" panose="020B0502040204020203" pitchFamily="34" charset="0"/>
+            </a:endParaRPr>
+          </a:p>
+          <a:p>
+            <a:endParaRPr lang="it-IT" sz="2000" dirty="0">
+              <a:latin typeface="Segoe UI" panose="020B0502040204020203" pitchFamily="34" charset="0"/>
+              <a:cs typeface="Segoe UI" panose="020B0502040204020203" pitchFamily="34" charset="0"/>
+            </a:endParaRPr>
+          </a:p>
+          <a:p>
+            <a:pPr marL="285750" indent="-285750">
+              <a:buFontTx/>
+              <a:buChar char="-"/>
+            </a:pPr>
+            <a:r>
+              <a:rPr lang="it-IT" sz="2000" dirty="0">
+                <a:latin typeface="Segoe UI" panose="020B0502040204020203" pitchFamily="34" charset="0"/>
+                <a:cs typeface="Segoe UI" panose="020B0502040204020203" pitchFamily="34" charset="0"/>
+              </a:rPr>
+              <a:t>It depends on the quality of chosen playback devices</a:t>
+            </a:r>
+          </a:p>
+          <a:p>
+            <a:pPr marL="285750" indent="-285750">
+              <a:buFontTx/>
+              <a:buChar char="-"/>
+            </a:pPr>
+            <a:r>
+              <a:rPr lang="it-IT" sz="2000" dirty="0">
+                <a:latin typeface="Segoe UI" panose="020B0502040204020203" pitchFamily="34" charset="0"/>
+                <a:cs typeface="Segoe UI" panose="020B0502040204020203" pitchFamily="34" charset="0"/>
+              </a:rPr>
+              <a:t>Encodes only standard music and uses only 60 channels</a:t>
+            </a:r>
+          </a:p>
+          <a:p>
+            <a:pPr marL="285750" indent="-285750">
+              <a:buFontTx/>
+              <a:buChar char="-"/>
+            </a:pPr>
+            <a:r>
+              <a:rPr lang="it-IT" sz="2000" dirty="0">
+                <a:latin typeface="Segoe UI" panose="020B0502040204020203" pitchFamily="34" charset="0"/>
+                <a:cs typeface="Segoe UI" panose="020B0502040204020203" pitchFamily="34" charset="0"/>
+              </a:rPr>
+              <a:t>Limited addressing with 16 channels</a:t>
+            </a:r>
+          </a:p>
+          <a:p>
+            <a:pPr marL="285750" indent="-285750">
+              <a:buFontTx/>
+              <a:buChar char="-"/>
+            </a:pPr>
+            <a:r>
+              <a:rPr lang="it-IT" sz="2000" dirty="0">
+                <a:latin typeface="Segoe UI" panose="020B0502040204020203" pitchFamily="34" charset="0"/>
+                <a:cs typeface="Segoe UI" panose="020B0502040204020203" pitchFamily="34" charset="0"/>
+              </a:rPr>
+              <a:t>Requires specific hardware </a:t>
+            </a:r>
           </a:p>
         </p:txBody>
       </p:sp>
@@ -2320,11 +2652,41 @@
                 <a:latin typeface="Segoe UI" panose="020B0502040204020203" pitchFamily="34" charset="0"/>
                 <a:cs typeface="Segoe UI" panose="020B0502040204020203" pitchFamily="34" charset="0"/>
               </a:rPr>
-              <a:t>MIDI Standard– 3/N</a:t>
-            </a:r>
-          </a:p>
-        </p:txBody>
-      </p:sp>
+              <a:t>MIDI Standard– 12/12</a:t>
+            </a:r>
+          </a:p>
+        </p:txBody>
+      </p:sp>
+      <p:pic>
+        <p:nvPicPr>
+          <p:cNvPr id="8" name="Immagine 7">
+            <a:extLst>
+              <a:ext uri="{FF2B5EF4-FFF2-40B4-BE49-F238E27FC236}">
+                <a16:creationId xmlns:a16="http://schemas.microsoft.com/office/drawing/2014/main" id="{A68EA5E1-C9BB-8F6E-D06E-D2E8DC997B18}"/>
+              </a:ext>
+            </a:extLst>
+          </p:cNvPr>
+          <p:cNvPicPr>
+            <a:picLocks noChangeAspect="1"/>
+          </p:cNvPicPr>
+          <p:nvPr/>
+        </p:nvPicPr>
+        <p:blipFill>
+          <a:blip r:embed="rId2"/>
+          <a:stretch>
+            <a:fillRect/>
+          </a:stretch>
+        </p:blipFill>
+        <p:spPr>
+          <a:xfrm>
+            <a:off x="2187146" y="5231210"/>
+            <a:ext cx="4528278" cy="955970"/>
+          </a:xfrm>
+          <a:prstGeom prst="rect">
+            <a:avLst/>
+          </a:prstGeom>
+        </p:spPr>
+      </p:pic>
     </p:spTree>
     <p:extLst>
       <p:ext uri="{BB962C8B-B14F-4D97-AF65-F5344CB8AC3E}">
@@ -2424,7 +2786,7 @@
                 <a:latin typeface="Segoe UI" panose="020B0502040204020203" pitchFamily="34" charset="0"/>
                 <a:cs typeface="Segoe UI" panose="020B0502040204020203" pitchFamily="34" charset="0"/>
               </a:rPr>
-              <a:t>MIDI Standard– 2/N</a:t>
+              <a:t>MIDI Standard– 2/12</a:t>
             </a:r>
           </a:p>
         </p:txBody>
@@ -2444,7 +2806,7 @@
         <p:spPr>
           <a:xfrm>
             <a:off x="400050" y="1423554"/>
-            <a:ext cx="8343900" cy="4524315"/>
+            <a:ext cx="8343900" cy="4893647"/>
           </a:xfrm>
           <a:prstGeom prst="rect">
             <a:avLst/>
@@ -2489,14 +2851,10 @@
                 <a:latin typeface="Segoe UI" panose="020B0502040204020203" pitchFamily="34" charset="0"/>
                 <a:cs typeface="Segoe UI" panose="020B0502040204020203" pitchFamily="34" charset="0"/>
               </a:rPr>
-              <a:t>Types of information</a:t>
-            </a:r>
-          </a:p>
-          <a:p>
-            <a:pPr marL="457200" indent="-457200">
-              <a:buFont typeface="Arial" panose="020B0604020202020204" pitchFamily="34" charset="0"/>
-              <a:buChar char="•"/>
-            </a:pPr>
+              <a:t>Types of information </a:t>
+            </a:r>
+          </a:p>
+          <a:p>
             <a:endParaRPr lang="it-IT" sz="2400" dirty="0">
               <a:latin typeface="Segoe UI" panose="020B0502040204020203" pitchFamily="34" charset="0"/>
               <a:cs typeface="Segoe UI" panose="020B0502040204020203" pitchFamily="34" charset="0"/>
@@ -2512,11 +2870,11 @@
                 <a:latin typeface="Segoe UI" panose="020B0502040204020203" pitchFamily="34" charset="0"/>
                 <a:cs typeface="Segoe UI" panose="020B0502040204020203" pitchFamily="34" charset="0"/>
               </a:rPr>
-              <a:t>Channels, tracks, patches</a:t>
-            </a:r>
-          </a:p>
-          <a:p>
-            <a:pPr marL="342900" indent="-342900">
+              <a:t>Types of messages and structure</a:t>
+            </a:r>
+          </a:p>
+          <a:p>
+            <a:pPr marL="457200" indent="-457200">
               <a:buFont typeface="Arial" panose="020B0604020202020204" pitchFamily="34" charset="0"/>
               <a:buChar char="•"/>
             </a:pPr>
@@ -2535,7 +2893,7 @@
                 <a:latin typeface="Segoe UI" panose="020B0502040204020203" pitchFamily="34" charset="0"/>
                 <a:cs typeface="Segoe UI" panose="020B0502040204020203" pitchFamily="34" charset="0"/>
               </a:rPr>
-              <a:t>Types of messages and modes</a:t>
+              <a:t>Channel/system messages</a:t>
             </a:r>
           </a:p>
           <a:p>
@@ -2558,7 +2916,7 @@
                 <a:latin typeface="Segoe UI" panose="020B0502040204020203" pitchFamily="34" charset="0"/>
                 <a:cs typeface="Segoe UI" panose="020B0502040204020203" pitchFamily="34" charset="0"/>
               </a:rPr>
-              <a:t>Devices and connections</a:t>
+              <a:t>General MIDI mode</a:t>
             </a:r>
           </a:p>
           <a:p>
@@ -2581,18 +2939,31 @@
                 <a:latin typeface="Segoe UI" panose="020B0502040204020203" pitchFamily="34" charset="0"/>
                 <a:cs typeface="Segoe UI" panose="020B0502040204020203" pitchFamily="34" charset="0"/>
               </a:rPr>
-              <a:t>Conclusions</a:t>
-            </a:r>
-          </a:p>
-          <a:p>
-            <a:pPr marL="285750" indent="-285750">
-              <a:buFontTx/>
-              <a:buChar char="-"/>
+              <a:t>Devices and connections (with example)</a:t>
+            </a:r>
+          </a:p>
+          <a:p>
+            <a:pPr marL="457200" indent="-457200">
+              <a:buFont typeface="Arial" panose="020B0604020202020204" pitchFamily="34" charset="0"/>
+              <a:buChar char="•"/>
             </a:pPr>
             <a:endParaRPr lang="it-IT" sz="2400" dirty="0">
               <a:latin typeface="Segoe UI" panose="020B0502040204020203" pitchFamily="34" charset="0"/>
               <a:cs typeface="Segoe UI" panose="020B0502040204020203" pitchFamily="34" charset="0"/>
             </a:endParaRPr>
+          </a:p>
+          <a:p>
+            <a:pPr marL="457200" indent="-457200">
+              <a:buFont typeface="Arial" panose="020B0604020202020204" pitchFamily="34" charset="0"/>
+              <a:buChar char="•"/>
+            </a:pPr>
+            <a:r>
+              <a:rPr lang="it-IT" sz="2400" dirty="0">
+                <a:latin typeface="Segoe UI" panose="020B0502040204020203" pitchFamily="34" charset="0"/>
+                <a:cs typeface="Segoe UI" panose="020B0502040204020203" pitchFamily="34" charset="0"/>
+              </a:rPr>
+              <a:t>Conclusions</a:t>
+            </a:r>
           </a:p>
         </p:txBody>
       </p:sp>
@@ -2830,19 +3201,8 @@
                 <a:latin typeface="Segoe UI" panose="020B0502040204020203" pitchFamily="34" charset="0"/>
                 <a:cs typeface="Segoe UI" panose="020B0502040204020203" pitchFamily="34" charset="0"/>
               </a:rPr>
-              <a:t>Coding not completely standard and requires specific </a:t>
-            </a:r>
-            <a:r>
-              <a:rPr lang="it-IT" altLang="it-IT" sz="2000" dirty="0" err="1">
-                <a:latin typeface="Segoe UI" panose="020B0502040204020203" pitchFamily="34" charset="0"/>
-                <a:cs typeface="Segoe UI" panose="020B0502040204020203" pitchFamily="34" charset="0"/>
-              </a:rPr>
-              <a:t>equipment</a:t>
-            </a:r>
-            <a:endParaRPr lang="it-IT" altLang="it-IT" sz="2000" dirty="0">
-              <a:latin typeface="Segoe UI" panose="020B0502040204020203" pitchFamily="34" charset="0"/>
-              <a:cs typeface="Segoe UI" panose="020B0502040204020203" pitchFamily="34" charset="0"/>
-            </a:endParaRPr>
+              <a:t>Coding not completely standard and requires specific equipment</a:t>
+            </a:r>
           </a:p>
           <a:p>
             <a:pPr marL="285750" marR="0" lvl="0" indent="-285750" fontAlgn="base">
@@ -2888,7 +3248,7 @@
                 <a:latin typeface="Segoe UI" panose="020B0502040204020203" pitchFamily="34" charset="0"/>
                 <a:cs typeface="Segoe UI" panose="020B0502040204020203" pitchFamily="34" charset="0"/>
               </a:rPr>
-              <a:t>Used only for western music encoding</a:t>
+              <a:t>Mainly used for music composition and supports only western music</a:t>
             </a:r>
           </a:p>
         </p:txBody>
@@ -2924,7 +3284,7 @@
                 <a:latin typeface="Segoe UI" panose="020B0502040204020203" pitchFamily="34" charset="0"/>
                 <a:cs typeface="Segoe UI" panose="020B0502040204020203" pitchFamily="34" charset="0"/>
               </a:rPr>
-              <a:t>MIDI Standard– 3/N</a:t>
+              <a:t>MIDI Standard– 3/12</a:t>
             </a:r>
           </a:p>
         </p:txBody>
@@ -2965,6 +3325,41 @@
           </a:prstGeom>
         </p:spPr>
       </p:pic>
+      <p:sp>
+        <p:nvSpPr>
+          <p:cNvPr id="3" name="CasellaDiTesto 2">
+            <a:extLst>
+              <a:ext uri="{FF2B5EF4-FFF2-40B4-BE49-F238E27FC236}">
+                <a16:creationId xmlns:a16="http://schemas.microsoft.com/office/drawing/2014/main" id="{A75CB542-D1CA-680F-E94D-2BAE4A22A1E7}"/>
+              </a:ext>
+            </a:extLst>
+          </p:cNvPr>
+          <p:cNvSpPr txBox="1"/>
+          <p:nvPr/>
+        </p:nvSpPr>
+        <p:spPr>
+          <a:xfrm>
+            <a:off x="3814254" y="2615114"/>
+            <a:ext cx="1515492" cy="276999"/>
+          </a:xfrm>
+          <a:prstGeom prst="rect">
+            <a:avLst/>
+          </a:prstGeom>
+          <a:noFill/>
+        </p:spPr>
+        <p:txBody>
+          <a:bodyPr wrap="square" rtlCol="0">
+            <a:spAutoFit/>
+          </a:bodyPr>
+          <a:lstStyle/>
+          <a:p>
+            <a:r>
+              <a:rPr lang="it-IT" sz="1200" dirty="0"/>
+              <a:t>Source: midi.org</a:t>
+            </a:r>
+          </a:p>
+        </p:txBody>
+      </p:sp>
     </p:spTree>
     <p:extLst>
       <p:ext uri="{BB962C8B-B14F-4D97-AF65-F5344CB8AC3E}">
@@ -3245,7 +3640,7 @@
                 <a:latin typeface="Segoe UI" panose="020B0502040204020203" pitchFamily="34" charset="0"/>
                 <a:cs typeface="Segoe UI" panose="020B0502040204020203" pitchFamily="34" charset="0"/>
               </a:rPr>
-              <a:t>MIDI Standard– 3/N</a:t>
+              <a:t>MIDI Standard– 4/12</a:t>
             </a:r>
           </a:p>
         </p:txBody>
@@ -3414,7 +3809,7 @@
                 <a:latin typeface="Segoe UI" panose="020B0502040204020203" pitchFamily="34" charset="0"/>
                 <a:cs typeface="Segoe UI" panose="020B0502040204020203" pitchFamily="34" charset="0"/>
               </a:rPr>
-              <a:t>MIDI Standard– 3/N</a:t>
+              <a:t>MIDI Standard– 5/12</a:t>
             </a:r>
           </a:p>
         </p:txBody>
@@ -3583,7 +3978,7 @@
                 <a:latin typeface="Segoe UI" panose="020B0502040204020203" pitchFamily="34" charset="0"/>
                 <a:cs typeface="Segoe UI" panose="020B0502040204020203" pitchFamily="34" charset="0"/>
               </a:rPr>
-              <a:t>MIDI Standard– 3/N</a:t>
+              <a:t>MIDI Standard– 6/12</a:t>
             </a:r>
           </a:p>
         </p:txBody>
@@ -3602,7 +3997,7 @@
         </p:nvSpPr>
         <p:spPr>
           <a:xfrm>
-            <a:off x="2635225" y="6081169"/>
+            <a:off x="2893166" y="6021867"/>
             <a:ext cx="3357668" cy="276999"/>
           </a:xfrm>
           <a:prstGeom prst="rect">
@@ -3645,7 +4040,7 @@
         </p:blipFill>
         <p:spPr>
           <a:xfrm>
-            <a:off x="1333906" y="1220525"/>
+            <a:off x="1895469" y="1220525"/>
             <a:ext cx="5353062" cy="4860644"/>
           </a:xfrm>
           <a:prstGeom prst="rect">
@@ -3752,7 +4147,7 @@
                 <a:latin typeface="Segoe UI" panose="020B0502040204020203" pitchFamily="34" charset="0"/>
                 <a:cs typeface="Segoe UI" panose="020B0502040204020203" pitchFamily="34" charset="0"/>
               </a:rPr>
-              <a:t>MIDI Standard– 3/N</a:t>
+              <a:t>MIDI Standard– 7/12</a:t>
             </a:r>
           </a:p>
         </p:txBody>
@@ -4134,7 +4529,7 @@
                 <a:latin typeface="Segoe UI" panose="020B0502040204020203" pitchFamily="34" charset="0"/>
                 <a:cs typeface="Segoe UI" panose="020B0502040204020203" pitchFamily="34" charset="0"/>
               </a:rPr>
-              <a:t>MIDI Standard– 3/N</a:t>
+              <a:t>MIDI Standard– 8/12</a:t>
             </a:r>
           </a:p>
         </p:txBody>
@@ -4535,7 +4930,7 @@
                 <a:latin typeface="Segoe UI" panose="020B0502040204020203" pitchFamily="34" charset="0"/>
                 <a:cs typeface="Segoe UI" panose="020B0502040204020203" pitchFamily="34" charset="0"/>
               </a:rPr>
-              <a:t>MIDI Standard– 3/N</a:t>
+              <a:t>MIDI Standard– 9/12</a:t>
             </a:r>
           </a:p>
         </p:txBody>
@@ -4554,8 +4949,8 @@
         </p:nvSpPr>
         <p:spPr>
           <a:xfrm>
-            <a:off x="159574" y="1348437"/>
-            <a:ext cx="8715074" cy="400110"/>
+            <a:off x="251533" y="1348437"/>
+            <a:ext cx="4456391" cy="5016758"/>
           </a:xfrm>
           <a:prstGeom prst="rect">
             <a:avLst/>
@@ -4573,11 +4968,171 @@
               <a:buChar char="-"/>
             </a:pPr>
             <a:r>
-              <a:rPr lang="it-IT" sz="2000" u="sng" dirty="0">
-                <a:latin typeface="Segoe UI" panose="020B0502040204020203" pitchFamily="34" charset="0"/>
-                <a:cs typeface="Segoe UI" panose="020B0502040204020203" pitchFamily="34" charset="0"/>
-              </a:rPr>
-              <a:t>ABC it’s easy</a:t>
+              <a:rPr lang="it-IT" sz="2000" dirty="0">
+                <a:latin typeface="Segoe UI" panose="020B0502040204020203" pitchFamily="34" charset="0"/>
+                <a:cs typeface="Segoe UI" panose="020B0502040204020203" pitchFamily="34" charset="0"/>
+              </a:rPr>
+              <a:t>Encoding specifying a priori channels/patches/timbres association</a:t>
+            </a:r>
+          </a:p>
+          <a:p>
+            <a:endParaRPr lang="it-IT" sz="2000" dirty="0">
+              <a:latin typeface="Segoe UI" panose="020B0502040204020203" pitchFamily="34" charset="0"/>
+              <a:cs typeface="Segoe UI" panose="020B0502040204020203" pitchFamily="34" charset="0"/>
+            </a:endParaRPr>
+          </a:p>
+          <a:p>
+            <a:pPr marL="285750" indent="-285750">
+              <a:buFontTx/>
+              <a:buChar char="-"/>
+            </a:pPr>
+            <a:r>
+              <a:rPr lang="it-IT" sz="2000" dirty="0">
+                <a:latin typeface="Segoe UI" panose="020B0502040204020203" pitchFamily="34" charset="0"/>
+                <a:cs typeface="Segoe UI" panose="020B0502040204020203" pitchFamily="34" charset="0"/>
+              </a:rPr>
+              <a:t>All compliant MIDI instruments meet a certain set of features and presets</a:t>
+            </a:r>
+          </a:p>
+          <a:p>
+            <a:pPr marL="285750" indent="-285750">
+              <a:buFontTx/>
+              <a:buChar char="-"/>
+            </a:pPr>
+            <a:endParaRPr lang="it-IT" sz="2000" dirty="0">
+              <a:latin typeface="Segoe UI" panose="020B0502040204020203" pitchFamily="34" charset="0"/>
+              <a:cs typeface="Segoe UI" panose="020B0502040204020203" pitchFamily="34" charset="0"/>
+            </a:endParaRPr>
+          </a:p>
+          <a:p>
+            <a:pPr marL="285750" indent="-285750">
+              <a:buFontTx/>
+              <a:buChar char="-"/>
+            </a:pPr>
+            <a:r>
+              <a:rPr lang="it-IT" sz="2000" dirty="0">
+                <a:latin typeface="Segoe UI" panose="020B0502040204020203" pitchFamily="34" charset="0"/>
+                <a:cs typeface="Segoe UI" panose="020B0502040204020203" pitchFamily="34" charset="0"/>
+              </a:rPr>
+              <a:t>GM attaches specific interpretations to many parameters</a:t>
+            </a:r>
+          </a:p>
+          <a:p>
+            <a:pPr marL="285750" indent="-285750">
+              <a:buFontTx/>
+              <a:buChar char="-"/>
+            </a:pPr>
+            <a:endParaRPr lang="it-IT" sz="2000" dirty="0">
+              <a:latin typeface="Segoe UI" panose="020B0502040204020203" pitchFamily="34" charset="0"/>
+              <a:cs typeface="Segoe UI" panose="020B0502040204020203" pitchFamily="34" charset="0"/>
+            </a:endParaRPr>
+          </a:p>
+          <a:p>
+            <a:pPr marL="285750" indent="-285750">
+              <a:buFontTx/>
+              <a:buChar char="-"/>
+            </a:pPr>
+            <a:r>
+              <a:rPr lang="it-IT" sz="2000" dirty="0">
+                <a:latin typeface="Segoe UI" panose="020B0502040204020203" pitchFamily="34" charset="0"/>
+                <a:cs typeface="Segoe UI" panose="020B0502040204020203" pitchFamily="34" charset="0"/>
+              </a:rPr>
+              <a:t>There is no standard way to associate patches to a particular channel</a:t>
+            </a:r>
+          </a:p>
+          <a:p>
+            <a:pPr marL="742950" lvl="1" indent="-285750">
+              <a:buFontTx/>
+              <a:buChar char="-"/>
+            </a:pPr>
+            <a:r>
+              <a:rPr lang="it-IT" sz="2000" dirty="0">
+                <a:latin typeface="Segoe UI" panose="020B0502040204020203" pitchFamily="34" charset="0"/>
+                <a:cs typeface="Segoe UI" panose="020B0502040204020203" pitchFamily="34" charset="0"/>
+              </a:rPr>
+              <a:t>E.g., Roland/Yamaha defined their own internal standards</a:t>
+            </a:r>
+          </a:p>
+        </p:txBody>
+      </p:sp>
+      <p:pic>
+        <p:nvPicPr>
+          <p:cNvPr id="1026" name="Picture 2" descr="GM Standard Drum Map on the keyboard">
+            <a:extLst>
+              <a:ext uri="{FF2B5EF4-FFF2-40B4-BE49-F238E27FC236}">
+                <a16:creationId xmlns:a16="http://schemas.microsoft.com/office/drawing/2014/main" id="{7184451F-C028-167F-78F9-338A1B853A14}"/>
+              </a:ext>
+            </a:extLst>
+          </p:cNvPr>
+          <p:cNvPicPr>
+            <a:picLocks noChangeAspect="1" noChangeArrowheads="1"/>
+          </p:cNvPicPr>
+          <p:nvPr/>
+        </p:nvPicPr>
+        <p:blipFill>
+          <a:blip r:embed="rId2">
+            <a:extLst>
+              <a:ext uri="{28A0092B-C50C-407E-A947-70E740481C1C}">
+                <a14:useLocalDpi xmlns:a14="http://schemas.microsoft.com/office/drawing/2010/main" val="0"/>
+              </a:ext>
+            </a:extLst>
+          </a:blip>
+          <a:srcRect/>
+          <a:stretch>
+            <a:fillRect/>
+          </a:stretch>
+        </p:blipFill>
+        <p:spPr bwMode="auto">
+          <a:xfrm>
+            <a:off x="5493866" y="1247775"/>
+            <a:ext cx="2876550" cy="4362450"/>
+          </a:xfrm>
+          <a:prstGeom prst="rect">
+            <a:avLst/>
+          </a:prstGeom>
+          <a:noFill/>
+          <a:extLst>
+            <a:ext uri="{909E8E84-426E-40DD-AFC4-6F175D3DCCD1}">
+              <a14:hiddenFill xmlns:a14="http://schemas.microsoft.com/office/drawing/2010/main">
+                <a:solidFill>
+                  <a:srgbClr val="FFFFFF"/>
+                </a:solidFill>
+              </a14:hiddenFill>
+            </a:ext>
+          </a:extLst>
+        </p:spPr>
+      </p:pic>
+      <p:sp>
+        <p:nvSpPr>
+          <p:cNvPr id="5" name="CasellaDiTesto 4">
+            <a:extLst>
+              <a:ext uri="{FF2B5EF4-FFF2-40B4-BE49-F238E27FC236}">
+                <a16:creationId xmlns:a16="http://schemas.microsoft.com/office/drawing/2014/main" id="{E827BD29-AEE2-418C-DA80-7FD10A646507}"/>
+              </a:ext>
+            </a:extLst>
+          </p:cNvPr>
+          <p:cNvSpPr txBox="1"/>
+          <p:nvPr/>
+        </p:nvSpPr>
+        <p:spPr>
+          <a:xfrm>
+            <a:off x="6303761" y="5716673"/>
+            <a:ext cx="1515492" cy="276999"/>
+          </a:xfrm>
+          <a:prstGeom prst="rect">
+            <a:avLst/>
+          </a:prstGeom>
+          <a:noFill/>
+        </p:spPr>
+        <p:txBody>
+          <a:bodyPr wrap="square" rtlCol="0">
+            <a:spAutoFit/>
+          </a:bodyPr>
+          <a:lstStyle/>
+          <a:p>
+            <a:r>
+              <a:rPr lang="it-IT" sz="1200" dirty="0"/>
+              <a:t>Source: Wikipedia</a:t>
             </a:r>
           </a:p>
         </p:txBody>

</xml_diff>